<commit_message>
revise FP_tetris_recurrence_well_order_variant, edit sound-valid
</commit_message>
<xml_diff>
--- a/spring17/slidesS17/sound-valid-for-handout.pptx
+++ b/spring17/slidesS17/sound-valid-for-handout.pptx
@@ -6,10 +6,10 @@
     <p:sldMasterId id="2147483651" r:id="rId2"/>
   </p:sldMasterIdLst>
   <p:notesMasterIdLst>
-    <p:notesMasterId r:id="rId35"/>
+    <p:notesMasterId r:id="rId36"/>
   </p:notesMasterIdLst>
   <p:handoutMasterIdLst>
-    <p:handoutMasterId r:id="rId36"/>
+    <p:handoutMasterId r:id="rId37"/>
   </p:handoutMasterIdLst>
   <p:sldIdLst>
     <p:sldId id="392" r:id="rId3"/>
@@ -36,19 +36,20 @@
     <p:sldId id="518" r:id="rId24"/>
     <p:sldId id="501" r:id="rId25"/>
     <p:sldId id="519" r:id="rId26"/>
-    <p:sldId id="491" r:id="rId27"/>
-    <p:sldId id="487" r:id="rId28"/>
-    <p:sldId id="488" r:id="rId29"/>
-    <p:sldId id="496" r:id="rId30"/>
-    <p:sldId id="498" r:id="rId31"/>
-    <p:sldId id="497" r:id="rId32"/>
-    <p:sldId id="490" r:id="rId33"/>
-    <p:sldId id="502" r:id="rId34"/>
+    <p:sldId id="532" r:id="rId27"/>
+    <p:sldId id="491" r:id="rId28"/>
+    <p:sldId id="487" r:id="rId29"/>
+    <p:sldId id="488" r:id="rId30"/>
+    <p:sldId id="496" r:id="rId31"/>
+    <p:sldId id="498" r:id="rId32"/>
+    <p:sldId id="497" r:id="rId33"/>
+    <p:sldId id="490" r:id="rId34"/>
+    <p:sldId id="502" r:id="rId35"/>
   </p:sldIdLst>
   <p:sldSz cx="9144000" cy="6858000" type="screen4x3"/>
   <p:notesSz cx="9601200" cy="7315200"/>
   <p:custDataLst>
-    <p:tags r:id="rId38"/>
+    <p:tags r:id="rId39"/>
   </p:custDataLst>
   <p:defaultTextStyle>
     <a:defPPr>
@@ -1170,7 +1171,7 @@
             <a:fld id="{A02B9F3F-3042-489F-AF35-1A733968F079}" type="slidenum">
               <a:rPr lang="en-US" smtClean="0"/>
               <a:pPr/>
-              <a:t>27</a:t>
+              <a:t>28</a:t>
             </a:fld>
             <a:endParaRPr lang="en-US"/>
           </a:p>
@@ -1252,7 +1253,7 @@
             <a:fld id="{A02B9F3F-3042-489F-AF35-1A733968F079}" type="slidenum">
               <a:rPr lang="en-US" smtClean="0"/>
               <a:pPr/>
-              <a:t>32</a:t>
+              <a:t>33</a:t>
             </a:fld>
             <a:endParaRPr lang="en-US"/>
           </a:p>
@@ -6545,11 +6546,7 @@
           <a:p>
             <a:r>
               <a:rPr lang="en-US" sz="5400" dirty="0" smtClean="0"/>
-              <a:t>If</a:t>
-            </a:r>
-            <a:r>
-              <a:rPr lang="en-US" sz="5400" dirty="0" smtClean="0"/>
-              <a:t> </a:t>
+              <a:t>If </a:t>
             </a:r>
             <a:r>
               <a:rPr lang="en-US" sz="5400" dirty="0" smtClean="0">
@@ -6750,13 +6747,13 @@
   <p:clrMapOvr>
     <a:masterClrMapping/>
   </p:clrMapOvr>
-  <mc:AlternateContent xmlns:mc="http://schemas.openxmlformats.org/markup-compatibility/2006">
-    <mc:Choice xmlns:p14="http://schemas.microsoft.com/office/powerpoint/2010/main" Requires="p14">
+  <mc:AlternateContent xmlns:mc="http://schemas.openxmlformats.org/markup-compatibility/2006" xmlns:p14="http://schemas.microsoft.com/office/powerpoint/2010/main">
+    <mc:Choice Requires="p14">
       <p:transition spd="slow" p14:dur="800" advClick="0">
         <p:fade thruBlk="1"/>
       </p:transition>
     </mc:Choice>
-    <mc:Fallback>
+    <mc:Fallback xmlns="">
       <p:transition xmlns:p14="http://schemas.microsoft.com/office/powerpoint/2010/main" spd="slow" advClick="0">
         <p:fade thruBlk="1"/>
       </p:transition>
@@ -7117,13 +7114,13 @@
   <p:clrMapOvr>
     <a:masterClrMapping/>
   </p:clrMapOvr>
-  <mc:AlternateContent xmlns:mc="http://schemas.openxmlformats.org/markup-compatibility/2006">
-    <mc:Choice xmlns:p14="http://schemas.microsoft.com/office/powerpoint/2010/main" Requires="p14">
+  <mc:AlternateContent xmlns:mc="http://schemas.openxmlformats.org/markup-compatibility/2006" xmlns:p14="http://schemas.microsoft.com/office/powerpoint/2010/main">
+    <mc:Choice Requires="p14">
       <p:transition p14:dur="400" advClick="0">
         <p:fade/>
       </p:transition>
     </mc:Choice>
-    <mc:Fallback>
+    <mc:Fallback xmlns="">
       <p:transition xmlns:p14="http://schemas.microsoft.com/office/powerpoint/2010/main" advClick="0">
         <p:fade/>
       </p:transition>
@@ -7140,7 +7137,7 @@
 </file>
 
 <file path=ppt/slides/slide12.xml><?xml version="1.0" encoding="utf-8"?>
-<p:sld xmlns:a="http://schemas.openxmlformats.org/drawingml/2006/main" xmlns:r="http://schemas.openxmlformats.org/officeDocument/2006/relationships" xmlns:p="http://schemas.openxmlformats.org/presentationml/2006/main" show="0">
+<p:sld xmlns:a="http://schemas.openxmlformats.org/drawingml/2006/main" xmlns:r="http://schemas.openxmlformats.org/officeDocument/2006/relationships" xmlns:p="http://schemas.openxmlformats.org/presentationml/2006/main">
   <p:cSld>
     <p:spTree>
       <p:nvGrpSpPr>
@@ -8655,7 +8652,7 @@
             <a:r>
               <a:rPr lang="en-US" sz="4400" dirty="0">
                 <a:solidFill>
-                  <a:srgbClr val="EC0213"/>
+                  <a:srgbClr val="006600"/>
                 </a:solidFill>
               </a:rPr>
               <a:t>T</a:t>
@@ -9938,13 +9935,13 @@
   <p:clrMapOvr>
     <a:masterClrMapping/>
   </p:clrMapOvr>
-  <mc:AlternateContent xmlns:mc="http://schemas.openxmlformats.org/markup-compatibility/2006">
-    <mc:Choice xmlns:p14="http://schemas.microsoft.com/office/powerpoint/2010/main" Requires="p14">
+  <mc:AlternateContent xmlns:mc="http://schemas.openxmlformats.org/markup-compatibility/2006" xmlns:p14="http://schemas.microsoft.com/office/powerpoint/2010/main">
+    <mc:Choice Requires="p14">
       <p:transition p14:dur="400" advClick="0">
         <p:fade/>
       </p:transition>
     </mc:Choice>
-    <mc:Fallback>
+    <mc:Fallback xmlns="">
       <p:transition xmlns:p14="http://schemas.microsoft.com/office/powerpoint/2010/main" advClick="0">
         <p:fade/>
       </p:transition>
@@ -10112,7 +10109,22 @@
               <a:rPr lang="en-US" sz="5400" dirty="0" smtClean="0">
                 <a:latin typeface="Comic Sans MS" pitchFamily="66" charset="0"/>
               </a:rPr>
-              <a:t> If proof rules are </a:t>
+              <a:t> If proof </a:t>
+            </a:r>
+            <a:r>
+              <a:rPr lang="en-US" sz="5400" dirty="0" smtClean="0">
+                <a:solidFill>
+                  <a:srgbClr val="0000FF"/>
+                </a:solidFill>
+                <a:latin typeface="Comic Sans MS" pitchFamily="66" charset="0"/>
+              </a:rPr>
+              <a:t>rules</a:t>
+            </a:r>
+            <a:r>
+              <a:rPr lang="en-US" sz="5400" dirty="0" smtClean="0">
+                <a:latin typeface="Comic Sans MS" pitchFamily="66" charset="0"/>
+              </a:rPr>
+              <a:t> are </a:t>
             </a:r>
             <a:r>
               <a:rPr lang="en-US" sz="5400" dirty="0" smtClean="0">
@@ -10420,6 +10432,9 @@
                     <p:cTn id="3" fill="hold">
                       <p:stCondLst>
                         <p:cond delay="indefinite"/>
+                        <p:cond evt="onBegin" delay="0">
+                          <p:tn val="2"/>
+                        </p:cond>
                       </p:stCondLst>
                       <p:childTnLst>
                         <p:par>
@@ -10429,7 +10444,7 @@
                             </p:stCondLst>
                             <p:childTnLst>
                               <p:par>
-                                <p:cTn id="5" presetID="10" presetClass="entr" presetSubtype="0" fill="hold" nodeType="clickEffect">
+                                <p:cTn id="5" presetID="10" presetClass="entr" presetSubtype="0" fill="hold" nodeType="afterEffect">
                                   <p:stCondLst>
                                     <p:cond delay="0"/>
                                   </p:stCondLst>
@@ -10694,7 +10709,22 @@
               <a:rPr lang="en-US" sz="5400" dirty="0" smtClean="0">
                 <a:latin typeface="Comic Sans MS" pitchFamily="66" charset="0"/>
               </a:rPr>
-              <a:t> If proof rules are </a:t>
+              <a:t> If proof </a:t>
+            </a:r>
+            <a:r>
+              <a:rPr lang="en-US" sz="5400" dirty="0" smtClean="0">
+                <a:solidFill>
+                  <a:srgbClr val="0000FF"/>
+                </a:solidFill>
+                <a:latin typeface="Comic Sans MS" pitchFamily="66" charset="0"/>
+              </a:rPr>
+              <a:t>rules</a:t>
+            </a:r>
+            <a:r>
+              <a:rPr lang="en-US" sz="5400" dirty="0" smtClean="0">
+                <a:latin typeface="Comic Sans MS" pitchFamily="66" charset="0"/>
+              </a:rPr>
+              <a:t> are </a:t>
             </a:r>
             <a:r>
               <a:rPr lang="en-US" sz="5400" dirty="0" smtClean="0">
@@ -10916,7 +10946,22 @@
               <a:rPr lang="en-US" sz="5400" dirty="0" smtClean="0">
                 <a:latin typeface="Comic Sans MS" pitchFamily="66" charset="0"/>
               </a:rPr>
-              <a:t> If proof rules are </a:t>
+              <a:t> If proof </a:t>
+            </a:r>
+            <a:r>
+              <a:rPr lang="en-US" sz="5400" dirty="0" smtClean="0">
+                <a:solidFill>
+                  <a:srgbClr val="0000FF"/>
+                </a:solidFill>
+                <a:latin typeface="Comic Sans MS" pitchFamily="66" charset="0"/>
+              </a:rPr>
+              <a:t>rules</a:t>
+            </a:r>
+            <a:r>
+              <a:rPr lang="en-US" sz="5400" dirty="0" smtClean="0">
+                <a:latin typeface="Comic Sans MS" pitchFamily="66" charset="0"/>
+              </a:rPr>
+              <a:t> are </a:t>
             </a:r>
             <a:r>
               <a:rPr lang="en-US" sz="5400" dirty="0" smtClean="0">
@@ -11147,21 +11192,36 @@
               <a:rPr lang="en-US" sz="5400" dirty="0" smtClean="0">
                 <a:latin typeface="Comic Sans MS" pitchFamily="66" charset="0"/>
               </a:rPr>
-              <a:t> If proof rules are </a:t>
+              <a:t> If proof </a:t>
             </a:r>
             <a:r>
               <a:rPr lang="en-US" sz="5400" dirty="0" smtClean="0">
                 <a:solidFill>
-                  <a:srgbClr val="006600"/>
+                  <a:srgbClr val="0000FF"/>
                 </a:solidFill>
                 <a:latin typeface="Comic Sans MS" pitchFamily="66" charset="0"/>
               </a:rPr>
-              <a:t>sound</a:t>
+              <a:t>rules</a:t>
             </a:r>
             <a:r>
               <a:rPr lang="en-US" sz="5400" dirty="0" smtClean="0">
                 <a:latin typeface="Comic Sans MS" pitchFamily="66" charset="0"/>
               </a:rPr>
+              <a:t> are </a:t>
+            </a:r>
+            <a:r>
+              <a:rPr lang="en-US" sz="5400" dirty="0" smtClean="0">
+                <a:solidFill>
+                  <a:srgbClr val="006600"/>
+                </a:solidFill>
+                <a:latin typeface="Comic Sans MS" pitchFamily="66" charset="0"/>
+              </a:rPr>
+              <a:t>sound</a:t>
+            </a:r>
+            <a:r>
+              <a:rPr lang="en-US" sz="5400" dirty="0" smtClean="0">
+                <a:latin typeface="Comic Sans MS" pitchFamily="66" charset="0"/>
+              </a:rPr>
               <a:t>, and axioms </a:t>
             </a:r>
             <a:r>
@@ -11183,7 +11243,22 @@
               <a:rPr lang="en-US" sz="5400" dirty="0" smtClean="0">
                 <a:latin typeface="Comic Sans MS" pitchFamily="66" charset="0"/>
               </a:rPr>
-              <a:t>, then the whole proof system is </a:t>
+              <a:t>, then the whole proof </a:t>
+            </a:r>
+            <a:r>
+              <a:rPr lang="en-US" sz="5400" dirty="0" smtClean="0">
+                <a:solidFill>
+                  <a:srgbClr val="0000FF"/>
+                </a:solidFill>
+                <a:latin typeface="Comic Sans MS" pitchFamily="66" charset="0"/>
+              </a:rPr>
+              <a:t>system</a:t>
+            </a:r>
+            <a:r>
+              <a:rPr lang="en-US" sz="5400" dirty="0" smtClean="0">
+                <a:latin typeface="Comic Sans MS" pitchFamily="66" charset="0"/>
+              </a:rPr>
+              <a:t> is </a:t>
             </a:r>
             <a:r>
               <a:rPr lang="en-US" sz="5400" dirty="0" smtClean="0">
@@ -11798,13 +11873,13 @@
   <p:clrMapOvr>
     <a:masterClrMapping/>
   </p:clrMapOvr>
-  <mc:AlternateContent xmlns:mc="http://schemas.openxmlformats.org/markup-compatibility/2006">
-    <mc:Choice xmlns:p14="http://schemas.microsoft.com/office/powerpoint/2010/main" Requires="p14">
+  <mc:AlternateContent xmlns:mc="http://schemas.openxmlformats.org/markup-compatibility/2006" xmlns:p14="http://schemas.microsoft.com/office/powerpoint/2010/main">
+    <mc:Choice Requires="p14">
       <p:transition p14:dur="400" advClick="0">
         <p:fade/>
       </p:transition>
     </mc:Choice>
-    <mc:Fallback>
+    <mc:Fallback xmlns="">
       <p:transition xmlns:p14="http://schemas.microsoft.com/office/powerpoint/2010/main" advClick="0">
         <p:fade/>
       </p:transition>
@@ -11821,6 +11896,474 @@
 </file>
 
 <file path=ppt/slides/slide25.xml><?xml version="1.0" encoding="utf-8"?>
+<p:sld xmlns:a="http://schemas.openxmlformats.org/drawingml/2006/main" xmlns:r="http://schemas.openxmlformats.org/officeDocument/2006/relationships" xmlns:p="http://schemas.openxmlformats.org/presentationml/2006/main">
+  <p:cSld>
+    <p:spTree>
+      <p:nvGrpSpPr>
+        <p:cNvPr id="1" name=""/>
+        <p:cNvGrpSpPr/>
+        <p:nvPr/>
+      </p:nvGrpSpPr>
+      <p:grpSpPr>
+        <a:xfrm>
+          <a:off x="0" y="0"/>
+          <a:ext cx="0" cy="0"/>
+          <a:chOff x="0" y="0"/>
+          <a:chExt cx="0" cy="0"/>
+        </a:xfrm>
+      </p:grpSpPr>
+      <p:sp>
+        <p:nvSpPr>
+          <p:cNvPr id="2" name="Title 1"/>
+          <p:cNvSpPr>
+            <a:spLocks noGrp="1"/>
+          </p:cNvSpPr>
+          <p:nvPr>
+            <p:ph type="title"/>
+          </p:nvPr>
+        </p:nvSpPr>
+        <p:spPr/>
+        <p:txBody>
+          <a:bodyPr/>
+          <a:lstStyle/>
+          <a:p>
+            <a:r>
+              <a:rPr lang="en-US" dirty="0" smtClean="0"/>
+              <a:t>Deduction &amp; Algebra</a:t>
+            </a:r>
+            <a:endParaRPr lang="en-US" dirty="0"/>
+          </a:p>
+        </p:txBody>
+      </p:sp>
+      <p:sp>
+        <p:nvSpPr>
+          <p:cNvPr id="3" name="Content Placeholder 2"/>
+          <p:cNvSpPr>
+            <a:spLocks noGrp="1"/>
+          </p:cNvSpPr>
+          <p:nvPr>
+            <p:ph idx="1"/>
+          </p:nvPr>
+        </p:nvSpPr>
+        <p:spPr>
+          <a:xfrm>
+            <a:off x="419567" y="1428871"/>
+            <a:ext cx="8323293" cy="4887633"/>
+          </a:xfrm>
+        </p:spPr>
+        <p:txBody>
+          <a:bodyPr/>
+          <a:lstStyle/>
+          <a:p>
+            <a:r>
+              <a:rPr lang="en-US" dirty="0" smtClean="0"/>
+              <a:t>Section 3.4 of the text &amp; </a:t>
+            </a:r>
+            <a:r>
+              <a:rPr lang="en-US" dirty="0" err="1" smtClean="0"/>
+              <a:t>MITx</a:t>
+            </a:r>
+            <a:r>
+              <a:rPr lang="en-US" dirty="0" smtClean="0"/>
+              <a:t> slides (optional this term) describe a complete proof system based on </a:t>
+            </a:r>
+          </a:p>
+          <a:p>
+            <a:r>
+              <a:rPr lang="en-US" dirty="0">
+                <a:solidFill>
+                  <a:schemeClr val="accent1">
+                    <a:lumMod val="50000"/>
+                  </a:schemeClr>
+                </a:solidFill>
+              </a:rPr>
+              <a:t> </a:t>
+            </a:r>
+            <a:r>
+              <a:rPr lang="en-US" dirty="0" smtClean="0">
+                <a:solidFill>
+                  <a:schemeClr val="accent1">
+                    <a:lumMod val="50000"/>
+                  </a:schemeClr>
+                </a:solidFill>
+              </a:rPr>
+              <a:t>  proving equivalences using algebra-style rules</a:t>
+            </a:r>
+            <a:endParaRPr lang="en-US" dirty="0" smtClean="0"/>
+          </a:p>
+          <a:p>
+            <a:r>
+              <a:rPr lang="en-US" dirty="0" err="1" smtClean="0"/>
+              <a:t>MITx</a:t>
+            </a:r>
+            <a:r>
+              <a:rPr lang="en-US" dirty="0" smtClean="0"/>
+              <a:t> slides “Propositional Logic”</a:t>
+            </a:r>
+          </a:p>
+          <a:p>
+            <a:r>
+              <a:rPr lang="en-US" dirty="0"/>
+              <a:t> </a:t>
+            </a:r>
+            <a:r>
+              <a:rPr lang="en-US" dirty="0" smtClean="0"/>
+              <a:t> (optional </a:t>
+            </a:r>
+            <a:r>
+              <a:rPr lang="en-US" dirty="0"/>
+              <a:t>Feb </a:t>
+            </a:r>
+            <a:r>
+              <a:rPr lang="en-US" dirty="0" smtClean="0"/>
+              <a:t>21) describe </a:t>
+            </a:r>
+            <a:r>
+              <a:rPr lang="en-US" dirty="0" smtClean="0">
+                <a:solidFill>
+                  <a:srgbClr val="BB0FAB"/>
+                </a:solidFill>
+              </a:rPr>
+              <a:t>modus ponens</a:t>
+            </a:r>
+            <a:r>
+              <a:rPr lang="en-US" dirty="0" smtClean="0"/>
+              <a:t> </a:t>
+            </a:r>
+            <a:r>
+              <a:rPr lang="en-US" dirty="0" smtClean="0">
+                <a:solidFill>
+                  <a:srgbClr val="0000E5"/>
+                </a:solidFill>
+              </a:rPr>
+              <a:t>based deduction system</a:t>
+            </a:r>
+            <a:endParaRPr lang="en-US" dirty="0">
+              <a:solidFill>
+                <a:srgbClr val="0000E5"/>
+              </a:solidFill>
+            </a:endParaRPr>
+          </a:p>
+        </p:txBody>
+      </p:sp>
+      <p:sp>
+        <p:nvSpPr>
+          <p:cNvPr id="4" name="Slide Number Placeholder 3"/>
+          <p:cNvSpPr>
+            <a:spLocks noGrp="1"/>
+          </p:cNvSpPr>
+          <p:nvPr>
+            <p:ph type="sldNum" sz="quarter" idx="10"/>
+          </p:nvPr>
+        </p:nvSpPr>
+        <p:spPr/>
+        <p:txBody>
+          <a:bodyPr/>
+          <a:lstStyle/>
+          <a:p>
+            <a:pPr>
+              <a:defRPr/>
+            </a:pPr>
+            <a:r>
+              <a:rPr lang="en-US" smtClean="0"/>
+              <a:t>sound.</a:t>
+            </a:r>
+            <a:fld id="{A528ADE2-B74F-4D9D-8D04-FB5D781EAB51}" type="slidenum">
+              <a:rPr lang="en-US" smtClean="0"/>
+              <a:pPr>
+                <a:defRPr/>
+              </a:pPr>
+              <a:t>25</a:t>
+            </a:fld>
+            <a:endParaRPr lang="en-US" dirty="0"/>
+          </a:p>
+        </p:txBody>
+      </p:sp>
+    </p:spTree>
+    <p:extLst>
+      <p:ext uri="{BB962C8B-B14F-4D97-AF65-F5344CB8AC3E}">
+        <p14:creationId xmlns:p14="http://schemas.microsoft.com/office/powerpoint/2010/main" val="898885485"/>
+      </p:ext>
+    </p:extLst>
+  </p:cSld>
+  <p:clrMapOvr>
+    <a:masterClrMapping/>
+  </p:clrMapOvr>
+  <mc:AlternateContent xmlns:mc="http://schemas.openxmlformats.org/markup-compatibility/2006">
+    <mc:Choice xmlns:p14="http://schemas.microsoft.com/office/powerpoint/2010/main" Requires="p14">
+      <p:transition spd="slow" p14:dur="1100" advClick="0">
+        <p:fade/>
+      </p:transition>
+    </mc:Choice>
+    <mc:Fallback>
+      <p:transition xmlns:p14="http://schemas.microsoft.com/office/powerpoint/2010/main" spd="slow" advClick="0">
+        <p:fade/>
+      </p:transition>
+    </mc:Fallback>
+  </mc:AlternateContent>
+  <p:timing>
+    <p:tnLst>
+      <p:par>
+        <p:cTn xmlns:p14="http://schemas.microsoft.com/office/powerpoint/2010/main" id="1" dur="indefinite" restart="never" nodeType="tmRoot">
+          <p:childTnLst>
+            <p:seq concurrent="1" nextAc="seek">
+              <p:cTn id="2" dur="indefinite" nodeType="mainSeq">
+                <p:childTnLst>
+                  <p:par>
+                    <p:cTn id="3" fill="hold">
+                      <p:stCondLst>
+                        <p:cond delay="indefinite"/>
+                        <p:cond evt="onBegin" delay="0">
+                          <p:tn val="2"/>
+                        </p:cond>
+                      </p:stCondLst>
+                      <p:childTnLst>
+                        <p:par>
+                          <p:cTn id="4" fill="hold">
+                            <p:stCondLst>
+                              <p:cond delay="0"/>
+                            </p:stCondLst>
+                            <p:childTnLst>
+                              <p:par>
+                                <p:cTn id="5" presetID="10" presetClass="entr" presetSubtype="0" fill="hold" nodeType="afterEffect">
+                                  <p:stCondLst>
+                                    <p:cond delay="0"/>
+                                  </p:stCondLst>
+                                  <p:childTnLst>
+                                    <p:set>
+                                      <p:cBhvr>
+                                        <p:cTn id="6" dur="1" fill="hold">
+                                          <p:stCondLst>
+                                            <p:cond delay="0"/>
+                                          </p:stCondLst>
+                                        </p:cTn>
+                                        <p:tgtEl>
+                                          <p:spTgt spid="3">
+                                            <p:txEl>
+                                              <p:pRg st="0" end="0"/>
+                                            </p:txEl>
+                                          </p:spTgt>
+                                        </p:tgtEl>
+                                        <p:attrNameLst>
+                                          <p:attrName>style.visibility</p:attrName>
+                                        </p:attrNameLst>
+                                      </p:cBhvr>
+                                      <p:to>
+                                        <p:strVal val="visible"/>
+                                      </p:to>
+                                    </p:set>
+                                    <p:animEffect transition="in" filter="fade">
+                                      <p:cBhvr>
+                                        <p:cTn id="7" dur="500"/>
+                                        <p:tgtEl>
+                                          <p:spTgt spid="3">
+                                            <p:txEl>
+                                              <p:pRg st="0" end="0"/>
+                                            </p:txEl>
+                                          </p:spTgt>
+                                        </p:tgtEl>
+                                      </p:cBhvr>
+                                    </p:animEffect>
+                                  </p:childTnLst>
+                                </p:cTn>
+                              </p:par>
+                            </p:childTnLst>
+                          </p:cTn>
+                        </p:par>
+                      </p:childTnLst>
+                    </p:cTn>
+                  </p:par>
+                  <p:par>
+                    <p:cTn id="8" fill="hold">
+                      <p:stCondLst>
+                        <p:cond delay="indefinite"/>
+                      </p:stCondLst>
+                      <p:childTnLst>
+                        <p:par>
+                          <p:cTn id="9" fill="hold">
+                            <p:stCondLst>
+                              <p:cond delay="0"/>
+                            </p:stCondLst>
+                            <p:childTnLst>
+                              <p:par>
+                                <p:cTn id="10" presetID="10" presetClass="entr" presetSubtype="0" fill="hold" nodeType="clickEffect">
+                                  <p:stCondLst>
+                                    <p:cond delay="0"/>
+                                  </p:stCondLst>
+                                  <p:childTnLst>
+                                    <p:set>
+                                      <p:cBhvr>
+                                        <p:cTn id="11" dur="1" fill="hold">
+                                          <p:stCondLst>
+                                            <p:cond delay="0"/>
+                                          </p:stCondLst>
+                                        </p:cTn>
+                                        <p:tgtEl>
+                                          <p:spTgt spid="3">
+                                            <p:txEl>
+                                              <p:pRg st="1" end="1"/>
+                                            </p:txEl>
+                                          </p:spTgt>
+                                        </p:tgtEl>
+                                        <p:attrNameLst>
+                                          <p:attrName>style.visibility</p:attrName>
+                                        </p:attrNameLst>
+                                      </p:cBhvr>
+                                      <p:to>
+                                        <p:strVal val="visible"/>
+                                      </p:to>
+                                    </p:set>
+                                    <p:animEffect transition="in" filter="fade">
+                                      <p:cBhvr>
+                                        <p:cTn id="12" dur="500"/>
+                                        <p:tgtEl>
+                                          <p:spTgt spid="3">
+                                            <p:txEl>
+                                              <p:pRg st="1" end="1"/>
+                                            </p:txEl>
+                                          </p:spTgt>
+                                        </p:tgtEl>
+                                      </p:cBhvr>
+                                    </p:animEffect>
+                                  </p:childTnLst>
+                                </p:cTn>
+                              </p:par>
+                            </p:childTnLst>
+                          </p:cTn>
+                        </p:par>
+                      </p:childTnLst>
+                    </p:cTn>
+                  </p:par>
+                  <p:par>
+                    <p:cTn id="13" fill="hold">
+                      <p:stCondLst>
+                        <p:cond delay="indefinite"/>
+                      </p:stCondLst>
+                      <p:childTnLst>
+                        <p:par>
+                          <p:cTn id="14" fill="hold">
+                            <p:stCondLst>
+                              <p:cond delay="0"/>
+                            </p:stCondLst>
+                            <p:childTnLst>
+                              <p:par>
+                                <p:cTn id="15" presetID="10" presetClass="entr" presetSubtype="0" fill="hold" nodeType="clickEffect">
+                                  <p:stCondLst>
+                                    <p:cond delay="0"/>
+                                  </p:stCondLst>
+                                  <p:childTnLst>
+                                    <p:set>
+                                      <p:cBhvr>
+                                        <p:cTn id="16" dur="1" fill="hold">
+                                          <p:stCondLst>
+                                            <p:cond delay="0"/>
+                                          </p:stCondLst>
+                                        </p:cTn>
+                                        <p:tgtEl>
+                                          <p:spTgt spid="3">
+                                            <p:txEl>
+                                              <p:pRg st="2" end="2"/>
+                                            </p:txEl>
+                                          </p:spTgt>
+                                        </p:tgtEl>
+                                        <p:attrNameLst>
+                                          <p:attrName>style.visibility</p:attrName>
+                                        </p:attrNameLst>
+                                      </p:cBhvr>
+                                      <p:to>
+                                        <p:strVal val="visible"/>
+                                      </p:to>
+                                    </p:set>
+                                    <p:animEffect transition="in" filter="fade">
+                                      <p:cBhvr>
+                                        <p:cTn id="17" dur="500"/>
+                                        <p:tgtEl>
+                                          <p:spTgt spid="3">
+                                            <p:txEl>
+                                              <p:pRg st="2" end="2"/>
+                                            </p:txEl>
+                                          </p:spTgt>
+                                        </p:tgtEl>
+                                      </p:cBhvr>
+                                    </p:animEffect>
+                                  </p:childTnLst>
+                                </p:cTn>
+                              </p:par>
+                              <p:par>
+                                <p:cTn id="18" presetID="10" presetClass="entr" presetSubtype="0" fill="hold" nodeType="withEffect">
+                                  <p:stCondLst>
+                                    <p:cond delay="0"/>
+                                  </p:stCondLst>
+                                  <p:childTnLst>
+                                    <p:set>
+                                      <p:cBhvr>
+                                        <p:cTn id="19" dur="1" fill="hold">
+                                          <p:stCondLst>
+                                            <p:cond delay="0"/>
+                                          </p:stCondLst>
+                                        </p:cTn>
+                                        <p:tgtEl>
+                                          <p:spTgt spid="3">
+                                            <p:txEl>
+                                              <p:pRg st="3" end="3"/>
+                                            </p:txEl>
+                                          </p:spTgt>
+                                        </p:tgtEl>
+                                        <p:attrNameLst>
+                                          <p:attrName>style.visibility</p:attrName>
+                                        </p:attrNameLst>
+                                      </p:cBhvr>
+                                      <p:to>
+                                        <p:strVal val="visible"/>
+                                      </p:to>
+                                    </p:set>
+                                    <p:animEffect transition="in" filter="fade">
+                                      <p:cBhvr>
+                                        <p:cTn id="20" dur="500"/>
+                                        <p:tgtEl>
+                                          <p:spTgt spid="3">
+                                            <p:txEl>
+                                              <p:pRg st="3" end="3"/>
+                                            </p:txEl>
+                                          </p:spTgt>
+                                        </p:tgtEl>
+                                      </p:cBhvr>
+                                    </p:animEffect>
+                                  </p:childTnLst>
+                                </p:cTn>
+                              </p:par>
+                            </p:childTnLst>
+                          </p:cTn>
+                        </p:par>
+                      </p:childTnLst>
+                    </p:cTn>
+                  </p:par>
+                </p:childTnLst>
+              </p:cTn>
+              <p:prevCondLst>
+                <p:cond evt="onPrev" delay="0">
+                  <p:tgtEl>
+                    <p:sldTgt/>
+                  </p:tgtEl>
+                </p:cond>
+              </p:prevCondLst>
+              <p:nextCondLst>
+                <p:cond evt="onNext" delay="0">
+                  <p:tgtEl>
+                    <p:sldTgt/>
+                  </p:tgtEl>
+                </p:cond>
+              </p:nextCondLst>
+            </p:seq>
+          </p:childTnLst>
+        </p:cTn>
+      </p:par>
+    </p:tnLst>
+  </p:timing>
+</p:sld>
+</file>
+
+<file path=ppt/slides/slide26.xml><?xml version="1.0" encoding="utf-8"?>
 <p:sld xmlns:a="http://schemas.openxmlformats.org/drawingml/2006/main" xmlns:r="http://schemas.openxmlformats.org/officeDocument/2006/relationships" xmlns:p="http://schemas.openxmlformats.org/presentationml/2006/main" show="0">
   <p:cSld>
     <p:spTree>
@@ -11939,7 +12482,7 @@
               <a:pPr>
                 <a:defRPr/>
               </a:pPr>
-              <a:t>25</a:t>
+              <a:t>26</a:t>
             </a:fld>
             <a:endParaRPr lang="en-US" dirty="0"/>
           </a:p>
@@ -12265,7 +12808,7 @@
 </p:sld>
 </file>
 
-<file path=ppt/slides/slide26.xml><?xml version="1.0" encoding="utf-8"?>
+<file path=ppt/slides/slide27.xml><?xml version="1.0" encoding="utf-8"?>
 <p:sld xmlns:a="http://schemas.openxmlformats.org/drawingml/2006/main" xmlns:r="http://schemas.openxmlformats.org/officeDocument/2006/relationships" xmlns:p="http://schemas.openxmlformats.org/presentationml/2006/main" show="0">
   <p:cSld>
     <p:spTree>
@@ -12547,7 +13090,7 @@
               <a:pPr>
                 <a:defRPr/>
               </a:pPr>
-              <a:t>26</a:t>
+              <a:t>27</a:t>
             </a:fld>
             <a:endParaRPr lang="en-US" dirty="0"/>
           </a:p>
@@ -12837,7 +13380,7 @@
 </p:sld>
 </file>
 
-<file path=ppt/slides/slide27.xml><?xml version="1.0" encoding="utf-8"?>
+<file path=ppt/slides/slide28.xml><?xml version="1.0" encoding="utf-8"?>
 <p:sld xmlns:a="http://schemas.openxmlformats.org/drawingml/2006/main" xmlns:r="http://schemas.openxmlformats.org/officeDocument/2006/relationships" xmlns:p="http://schemas.openxmlformats.org/presentationml/2006/main" show="0">
   <p:cSld>
     <p:spTree>
@@ -13080,7 +13623,7 @@
             <a:fld id="{3251DA95-B240-47FE-901D-B78FC8E8E532}" type="slidenum">
               <a:rPr lang="en-US" smtClean="0"/>
               <a:pPr/>
-              <a:t>27</a:t>
+              <a:t>28</a:t>
             </a:fld>
             <a:endParaRPr lang="en-US" dirty="0"/>
           </a:p>
@@ -13118,7 +13661,7 @@
 </p:sld>
 </file>
 
-<file path=ppt/slides/slide28.xml><?xml version="1.0" encoding="utf-8"?>
+<file path=ppt/slides/slide29.xml><?xml version="1.0" encoding="utf-8"?>
 <p:sld xmlns:a="http://schemas.openxmlformats.org/drawingml/2006/main" xmlns:r="http://schemas.openxmlformats.org/officeDocument/2006/relationships" xmlns:p="http://schemas.openxmlformats.org/presentationml/2006/main" show="0">
   <p:cSld>
     <p:spTree>
@@ -13235,7 +13778,7 @@
               <a:pPr>
                 <a:defRPr/>
               </a:pPr>
-              <a:t>28</a:t>
+              <a:t>29</a:t>
             </a:fld>
             <a:endParaRPr lang="en-US" dirty="0"/>
           </a:p>
@@ -13436,211 +13979,6 @@
 </p:sld>
 </file>
 
-<file path=ppt/slides/slide29.xml><?xml version="1.0" encoding="utf-8"?>
-<p:sld xmlns:a="http://schemas.openxmlformats.org/drawingml/2006/main" xmlns:r="http://schemas.openxmlformats.org/officeDocument/2006/relationships" xmlns:p="http://schemas.openxmlformats.org/presentationml/2006/main" show="0">
-  <p:cSld>
-    <p:spTree>
-      <p:nvGrpSpPr>
-        <p:cNvPr id="1" name=""/>
-        <p:cNvGrpSpPr/>
-        <p:nvPr/>
-      </p:nvGrpSpPr>
-      <p:grpSpPr>
-        <a:xfrm>
-          <a:off x="0" y="0"/>
-          <a:ext cx="0" cy="0"/>
-          <a:chOff x="0" y="0"/>
-          <a:chExt cx="0" cy="0"/>
-        </a:xfrm>
-      </p:grpSpPr>
-      <p:sp>
-        <p:nvSpPr>
-          <p:cNvPr id="3" name="Content Placeholder 2"/>
-          <p:cNvSpPr>
-            <a:spLocks noGrp="1"/>
-          </p:cNvSpPr>
-          <p:nvPr>
-            <p:ph idx="1"/>
-          </p:nvPr>
-        </p:nvSpPr>
-        <p:spPr>
-          <a:xfrm>
-            <a:off x="167924" y="1647914"/>
-            <a:ext cx="8868500" cy="4104042"/>
-          </a:xfrm>
-        </p:spPr>
-        <p:txBody>
-          <a:bodyPr/>
-          <a:lstStyle/>
-          <a:p>
-            <a:r>
-              <a:rPr lang="en-US" sz="4800" dirty="0" smtClean="0"/>
-              <a:t>If rules are strongly sound,</a:t>
-            </a:r>
-          </a:p>
-          <a:p>
-            <a:r>
-              <a:rPr lang="en-US" sz="4800" dirty="0" smtClean="0"/>
-              <a:t>and axioms </a:t>
-            </a:r>
-            <a:r>
-              <a:rPr lang="en-US" sz="4800" dirty="0"/>
-              <a:t>are </a:t>
-            </a:r>
-            <a:r>
-              <a:rPr lang="en-US" sz="4800" dirty="0">
-                <a:solidFill>
-                  <a:srgbClr val="006600"/>
-                </a:solidFill>
-              </a:rPr>
-              <a:t>true</a:t>
-            </a:r>
-            <a:r>
-              <a:rPr lang="en-US" sz="4800" dirty="0"/>
-              <a:t> in some </a:t>
-            </a:r>
-          </a:p>
-          <a:p>
-            <a:r>
-              <a:rPr lang="en-US" sz="4800" dirty="0" smtClean="0"/>
-              <a:t>environment, then the proof</a:t>
-            </a:r>
-            <a:endParaRPr lang="en-US" sz="4800" dirty="0"/>
-          </a:p>
-          <a:p>
-            <a:r>
-              <a:rPr lang="en-US" sz="4800" dirty="0"/>
-              <a:t>conclusion is </a:t>
-            </a:r>
-            <a:r>
-              <a:rPr lang="en-US" sz="4800" dirty="0" smtClean="0">
-                <a:solidFill>
-                  <a:srgbClr val="006600"/>
-                </a:solidFill>
-              </a:rPr>
-              <a:t>true</a:t>
-            </a:r>
-            <a:r>
-              <a:rPr lang="en-US" sz="4800" dirty="0" smtClean="0"/>
-              <a:t> in that </a:t>
-            </a:r>
-            <a:r>
-              <a:rPr lang="en-US" sz="4800" dirty="0" err="1" smtClean="0"/>
-              <a:t>env</a:t>
-            </a:r>
-            <a:endParaRPr lang="en-US" sz="4800" dirty="0"/>
-          </a:p>
-          <a:p>
-            <a:endParaRPr lang="en-US" sz="4800" dirty="0"/>
-          </a:p>
-        </p:txBody>
-      </p:sp>
-      <p:sp>
-        <p:nvSpPr>
-          <p:cNvPr id="4" name="Slide Number Placeholder 3"/>
-          <p:cNvSpPr>
-            <a:spLocks noGrp="1"/>
-          </p:cNvSpPr>
-          <p:nvPr>
-            <p:ph type="sldNum" sz="quarter" idx="10"/>
-          </p:nvPr>
-        </p:nvSpPr>
-        <p:spPr>
-          <a:xfrm>
-            <a:off x="8420278" y="6553200"/>
-            <a:ext cx="723726" cy="276999"/>
-          </a:xfrm>
-        </p:spPr>
-        <p:txBody>
-          <a:bodyPr/>
-          <a:lstStyle/>
-          <a:p>
-            <a:pPr>
-              <a:defRPr/>
-            </a:pPr>
-            <a:r>
-              <a:rPr lang="en-US" dirty="0" smtClean="0"/>
-              <a:t>sound.</a:t>
-            </a:r>
-            <a:fld id="{A528ADE2-B74F-4D9D-8D04-FB5D781EAB51}" type="slidenum">
-              <a:rPr lang="en-US" smtClean="0"/>
-              <a:pPr>
-                <a:defRPr/>
-              </a:pPr>
-              <a:t>29</a:t>
-            </a:fld>
-            <a:endParaRPr lang="en-US" dirty="0"/>
-          </a:p>
-        </p:txBody>
-      </p:sp>
-      <p:sp>
-        <p:nvSpPr>
-          <p:cNvPr id="7" name="Title 12"/>
-          <p:cNvSpPr>
-            <a:spLocks noGrp="1"/>
-          </p:cNvSpPr>
-          <p:nvPr>
-            <p:ph type="title"/>
-          </p:nvPr>
-        </p:nvSpPr>
-        <p:spPr>
-          <a:xfrm>
-            <a:off x="1700233" y="252320"/>
-            <a:ext cx="6681767" cy="1248648"/>
-          </a:xfrm>
-        </p:spPr>
-        <p:txBody>
-          <a:bodyPr/>
-          <a:lstStyle/>
-          <a:p>
-            <a:r>
-              <a:rPr lang="en-US" sz="4600" dirty="0" smtClean="0">
-                <a:solidFill>
-                  <a:srgbClr val="006600"/>
-                </a:solidFill>
-              </a:rPr>
-              <a:t>Strongly Sound</a:t>
-            </a:r>
-            <a:r>
-              <a:rPr lang="en-US" sz="4600" dirty="0" smtClean="0"/>
-              <a:t> Proofs</a:t>
-            </a:r>
-            <a:endParaRPr lang="en-US" sz="4600" dirty="0"/>
-          </a:p>
-        </p:txBody>
-      </p:sp>
-    </p:spTree>
-    <p:extLst>
-      <p:ext uri="{BB962C8B-B14F-4D97-AF65-F5344CB8AC3E}">
-        <p14:creationId xmlns:p14="http://schemas.microsoft.com/office/powerpoint/2010/main" val="2838872434"/>
-      </p:ext>
-    </p:extLst>
-  </p:cSld>
-  <p:clrMapOvr>
-    <a:masterClrMapping/>
-  </p:clrMapOvr>
-  <mc:AlternateContent xmlns:mc="http://schemas.openxmlformats.org/markup-compatibility/2006">
-    <mc:Choice xmlns:p14="http://schemas.microsoft.com/office/powerpoint/2010/main" Requires="p14">
-      <p:transition spd="slow" p14:dur="1200" advClick="0">
-        <p:fade thruBlk="1"/>
-      </p:transition>
-    </mc:Choice>
-    <mc:Fallback>
-      <p:transition xmlns:p14="http://schemas.microsoft.com/office/powerpoint/2010/main" spd="slow" advClick="0">
-        <p:fade thruBlk="1"/>
-      </p:transition>
-    </mc:Fallback>
-  </mc:AlternateContent>
-  <p:timing>
-    <p:tnLst>
-      <p:par>
-        <p:cTn xmlns:p14="http://schemas.microsoft.com/office/powerpoint/2010/main" id="1" dur="indefinite" restart="never" nodeType="tmRoot"/>
-      </p:par>
-    </p:tnLst>
-  </p:timing>
-</p:sld>
-</file>
-
 <file path=ppt/slides/slide3.xml><?xml version="1.0" encoding="utf-8"?>
 <p:sld xmlns:a="http://schemas.openxmlformats.org/drawingml/2006/main" xmlns:r="http://schemas.openxmlformats.org/officeDocument/2006/relationships" xmlns:p="http://schemas.openxmlformats.org/presentationml/2006/main">
   <p:cSld>
@@ -13857,8 +14195,8 @@
         </p:nvSpPr>
         <p:spPr>
           <a:xfrm>
-            <a:off x="327644" y="1619732"/>
-            <a:ext cx="8708780" cy="4132224"/>
+            <a:off x="167924" y="1647914"/>
+            <a:ext cx="8868500" cy="4104042"/>
           </a:xfrm>
         </p:spPr>
         <p:txBody>
@@ -13866,11 +14204,21 @@
           <a:lstStyle/>
           <a:p>
             <a:r>
-              <a:rPr lang="en-US" sz="5400" dirty="0" smtClean="0"/>
-              <a:t>If axioms are </a:t>
-            </a:r>
-            <a:r>
-              <a:rPr lang="en-US" sz="5400" dirty="0" smtClean="0">
+              <a:rPr lang="en-US" sz="4800" dirty="0" smtClean="0"/>
+              <a:t>If rules are strongly sound,</a:t>
+            </a:r>
+          </a:p>
+          <a:p>
+            <a:r>
+              <a:rPr lang="en-US" sz="4800" dirty="0" smtClean="0"/>
+              <a:t>and axioms </a:t>
+            </a:r>
+            <a:r>
+              <a:rPr lang="en-US" sz="4800" dirty="0"/>
+              <a:t>are </a:t>
+            </a:r>
+            <a:r>
+              <a:rPr lang="en-US" sz="4800" dirty="0">
                 <a:solidFill>
                   <a:srgbClr val="006600"/>
                 </a:solidFill>
@@ -13878,29 +14226,24 @@
               <a:t>true</a:t>
             </a:r>
             <a:r>
-              <a:rPr lang="en-US" sz="5400" dirty="0" smtClean="0"/>
+              <a:rPr lang="en-US" sz="4800" dirty="0"/>
               <a:t> in some </a:t>
             </a:r>
           </a:p>
           <a:p>
             <a:r>
-              <a:rPr lang="en-US" sz="5400" dirty="0" smtClean="0"/>
-              <a:t>environment, and rules are </a:t>
-            </a:r>
-          </a:p>
-          <a:p>
-            <a:r>
-              <a:rPr lang="en-US" sz="5400" dirty="0" smtClean="0"/>
-              <a:t>strongly sound, then </a:t>
-            </a:r>
-          </a:p>
-          <a:p>
-            <a:r>
-              <a:rPr lang="en-US" sz="5400" dirty="0" smtClean="0"/>
+              <a:rPr lang="en-US" sz="4800" dirty="0" smtClean="0"/>
+              <a:t>environment, then the proof</a:t>
+            </a:r>
+            <a:endParaRPr lang="en-US" sz="4800" dirty="0"/>
+          </a:p>
+          <a:p>
+            <a:r>
+              <a:rPr lang="en-US" sz="4800" dirty="0"/>
               <a:t>conclusion is </a:t>
             </a:r>
             <a:r>
-              <a:rPr lang="en-US" sz="5400" dirty="0" smtClean="0">
+              <a:rPr lang="en-US" sz="4800" dirty="0" smtClean="0">
                 <a:solidFill>
                   <a:srgbClr val="006600"/>
                 </a:solidFill>
@@ -13908,10 +14251,17 @@
               <a:t>true</a:t>
             </a:r>
             <a:r>
-              <a:rPr lang="en-US" sz="5400" dirty="0" smtClean="0"/>
-              <a:t>.</a:t>
-            </a:r>
-            <a:endParaRPr lang="en-US" sz="5400" dirty="0"/>
+              <a:rPr lang="en-US" sz="4800" dirty="0" smtClean="0"/>
+              <a:t> in that </a:t>
+            </a:r>
+            <a:r>
+              <a:rPr lang="en-US" sz="4800" dirty="0" err="1" smtClean="0"/>
+              <a:t>env</a:t>
+            </a:r>
+            <a:endParaRPr lang="en-US" sz="4800" dirty="0"/>
+          </a:p>
+          <a:p>
+            <a:endParaRPr lang="en-US" sz="4800" dirty="0"/>
           </a:p>
         </p:txBody>
       </p:sp>
@@ -13948,6 +14298,199 @@
                 <a:defRPr/>
               </a:pPr>
               <a:t>30</a:t>
+            </a:fld>
+            <a:endParaRPr lang="en-US" dirty="0"/>
+          </a:p>
+        </p:txBody>
+      </p:sp>
+      <p:sp>
+        <p:nvSpPr>
+          <p:cNvPr id="7" name="Title 12"/>
+          <p:cNvSpPr>
+            <a:spLocks noGrp="1"/>
+          </p:cNvSpPr>
+          <p:nvPr>
+            <p:ph type="title"/>
+          </p:nvPr>
+        </p:nvSpPr>
+        <p:spPr>
+          <a:xfrm>
+            <a:off x="1700233" y="252320"/>
+            <a:ext cx="6681767" cy="1248648"/>
+          </a:xfrm>
+        </p:spPr>
+        <p:txBody>
+          <a:bodyPr/>
+          <a:lstStyle/>
+          <a:p>
+            <a:r>
+              <a:rPr lang="en-US" sz="4600" dirty="0" smtClean="0">
+                <a:solidFill>
+                  <a:srgbClr val="006600"/>
+                </a:solidFill>
+              </a:rPr>
+              <a:t>Strongly Sound</a:t>
+            </a:r>
+            <a:r>
+              <a:rPr lang="en-US" sz="4600" dirty="0" smtClean="0"/>
+              <a:t> Proofs</a:t>
+            </a:r>
+            <a:endParaRPr lang="en-US" sz="4600" dirty="0"/>
+          </a:p>
+        </p:txBody>
+      </p:sp>
+    </p:spTree>
+    <p:extLst>
+      <p:ext uri="{BB962C8B-B14F-4D97-AF65-F5344CB8AC3E}">
+        <p14:creationId xmlns:p14="http://schemas.microsoft.com/office/powerpoint/2010/main" val="2838872434"/>
+      </p:ext>
+    </p:extLst>
+  </p:cSld>
+  <p:clrMapOvr>
+    <a:masterClrMapping/>
+  </p:clrMapOvr>
+  <mc:AlternateContent xmlns:mc="http://schemas.openxmlformats.org/markup-compatibility/2006">
+    <mc:Choice xmlns:p14="http://schemas.microsoft.com/office/powerpoint/2010/main" Requires="p14">
+      <p:transition spd="slow" p14:dur="1200" advClick="0">
+        <p:fade thruBlk="1"/>
+      </p:transition>
+    </mc:Choice>
+    <mc:Fallback>
+      <p:transition xmlns:p14="http://schemas.microsoft.com/office/powerpoint/2010/main" spd="slow" advClick="0">
+        <p:fade thruBlk="1"/>
+      </p:transition>
+    </mc:Fallback>
+  </mc:AlternateContent>
+  <p:timing>
+    <p:tnLst>
+      <p:par>
+        <p:cTn xmlns:p14="http://schemas.microsoft.com/office/powerpoint/2010/main" id="1" dur="indefinite" restart="never" nodeType="tmRoot"/>
+      </p:par>
+    </p:tnLst>
+  </p:timing>
+</p:sld>
+</file>
+
+<file path=ppt/slides/slide31.xml><?xml version="1.0" encoding="utf-8"?>
+<p:sld xmlns:a="http://schemas.openxmlformats.org/drawingml/2006/main" xmlns:r="http://schemas.openxmlformats.org/officeDocument/2006/relationships" xmlns:p="http://schemas.openxmlformats.org/presentationml/2006/main" show="0">
+  <p:cSld>
+    <p:spTree>
+      <p:nvGrpSpPr>
+        <p:cNvPr id="1" name=""/>
+        <p:cNvGrpSpPr/>
+        <p:nvPr/>
+      </p:nvGrpSpPr>
+      <p:grpSpPr>
+        <a:xfrm>
+          <a:off x="0" y="0"/>
+          <a:ext cx="0" cy="0"/>
+          <a:chOff x="0" y="0"/>
+          <a:chExt cx="0" cy="0"/>
+        </a:xfrm>
+      </p:grpSpPr>
+      <p:sp>
+        <p:nvSpPr>
+          <p:cNvPr id="3" name="Content Placeholder 2"/>
+          <p:cNvSpPr>
+            <a:spLocks noGrp="1"/>
+          </p:cNvSpPr>
+          <p:nvPr>
+            <p:ph idx="1"/>
+          </p:nvPr>
+        </p:nvSpPr>
+        <p:spPr>
+          <a:xfrm>
+            <a:off x="327644" y="1619732"/>
+            <a:ext cx="8708780" cy="4132224"/>
+          </a:xfrm>
+        </p:spPr>
+        <p:txBody>
+          <a:bodyPr/>
+          <a:lstStyle/>
+          <a:p>
+            <a:r>
+              <a:rPr lang="en-US" sz="5400" dirty="0" smtClean="0"/>
+              <a:t>If axioms are </a:t>
+            </a:r>
+            <a:r>
+              <a:rPr lang="en-US" sz="5400" dirty="0" smtClean="0">
+                <a:solidFill>
+                  <a:srgbClr val="006600"/>
+                </a:solidFill>
+              </a:rPr>
+              <a:t>true</a:t>
+            </a:r>
+            <a:r>
+              <a:rPr lang="en-US" sz="5400" dirty="0" smtClean="0"/>
+              <a:t> in some </a:t>
+            </a:r>
+          </a:p>
+          <a:p>
+            <a:r>
+              <a:rPr lang="en-US" sz="5400" dirty="0" smtClean="0"/>
+              <a:t>environment, and rules are </a:t>
+            </a:r>
+          </a:p>
+          <a:p>
+            <a:r>
+              <a:rPr lang="en-US" sz="5400" dirty="0" smtClean="0"/>
+              <a:t>strongly sound, then </a:t>
+            </a:r>
+          </a:p>
+          <a:p>
+            <a:r>
+              <a:rPr lang="en-US" sz="5400" dirty="0" smtClean="0"/>
+              <a:t>conclusion is </a:t>
+            </a:r>
+            <a:r>
+              <a:rPr lang="en-US" sz="5400" dirty="0" smtClean="0">
+                <a:solidFill>
+                  <a:srgbClr val="006600"/>
+                </a:solidFill>
+              </a:rPr>
+              <a:t>true</a:t>
+            </a:r>
+            <a:r>
+              <a:rPr lang="en-US" sz="5400" dirty="0" smtClean="0"/>
+              <a:t>.</a:t>
+            </a:r>
+            <a:endParaRPr lang="en-US" sz="5400" dirty="0"/>
+          </a:p>
+        </p:txBody>
+      </p:sp>
+      <p:sp>
+        <p:nvSpPr>
+          <p:cNvPr id="4" name="Slide Number Placeholder 3"/>
+          <p:cNvSpPr>
+            <a:spLocks noGrp="1"/>
+          </p:cNvSpPr>
+          <p:nvPr>
+            <p:ph type="sldNum" sz="quarter" idx="10"/>
+          </p:nvPr>
+        </p:nvSpPr>
+        <p:spPr>
+          <a:xfrm>
+            <a:off x="8420278" y="6553200"/>
+            <a:ext cx="723726" cy="276999"/>
+          </a:xfrm>
+        </p:spPr>
+        <p:txBody>
+          <a:bodyPr/>
+          <a:lstStyle/>
+          <a:p>
+            <a:pPr>
+              <a:defRPr/>
+            </a:pPr>
+            <a:r>
+              <a:rPr lang="en-US" dirty="0" smtClean="0"/>
+              <a:t>sound.</a:t>
+            </a:r>
+            <a:fld id="{A528ADE2-B74F-4D9D-8D04-FB5D781EAB51}" type="slidenum">
+              <a:rPr lang="en-US" smtClean="0"/>
+              <a:pPr>
+                <a:defRPr/>
+              </a:pPr>
+              <a:t>31</a:t>
             </a:fld>
             <a:endParaRPr lang="en-US" dirty="0"/>
           </a:p>
@@ -14108,7 +14651,7 @@
 </p:sld>
 </file>
 
-<file path=ppt/slides/slide31.xml><?xml version="1.0" encoding="utf-8"?>
+<file path=ppt/slides/slide32.xml><?xml version="1.0" encoding="utf-8"?>
 <p:sld xmlns:a="http://schemas.openxmlformats.org/drawingml/2006/main" xmlns:r="http://schemas.openxmlformats.org/officeDocument/2006/relationships" xmlns:p="http://schemas.openxmlformats.org/presentationml/2006/main" show="0">
   <p:cSld>
     <p:spTree>
@@ -14188,7 +14731,7 @@
               <a:pPr>
                 <a:defRPr/>
               </a:pPr>
-              <a:t>31</a:t>
+              <a:t>32</a:t>
             </a:fld>
             <a:endParaRPr lang="en-US" dirty="0"/>
           </a:p>
@@ -14440,7 +14983,7 @@
 </p:sld>
 </file>
 
-<file path=ppt/slides/slide32.xml><?xml version="1.0" encoding="utf-8"?>
+<file path=ppt/slides/slide33.xml><?xml version="1.0" encoding="utf-8"?>
 <p:sld xmlns:a="http://schemas.openxmlformats.org/drawingml/2006/main" xmlns:r="http://schemas.openxmlformats.org/officeDocument/2006/relationships" xmlns:p="http://schemas.openxmlformats.org/presentationml/2006/main">
   <p:cSld>
     <p:spTree>
@@ -14497,8 +15040,8 @@
         </p:nvSpPr>
         <p:spPr>
           <a:xfrm>
-            <a:off x="650634" y="1601332"/>
-            <a:ext cx="7704821" cy="3785652"/>
+            <a:off x="340196" y="1360828"/>
+            <a:ext cx="8742860" cy="4365986"/>
           </a:xfrm>
           <a:prstGeom prst="rect">
             <a:avLst/>
@@ -14513,7 +15056,7 @@
           <a:p>
             <a:pPr algn="l"/>
             <a:r>
-              <a:rPr lang="en-US" sz="4800" dirty="0" smtClean="0">
+              <a:rPr lang="en-US" sz="5400" dirty="0" smtClean="0">
                 <a:latin typeface="Comic Sans MS" pitchFamily="66" charset="0"/>
               </a:rPr>
               <a:t>Known proof systems</a:t>
@@ -14522,7 +15065,7 @@
           <a:p>
             <a:pPr algn="l"/>
             <a:r>
-              <a:rPr lang="en-US" sz="4800" dirty="0" smtClean="0">
+              <a:rPr lang="en-US" sz="5400" dirty="0" smtClean="0">
                 <a:solidFill>
                   <a:schemeClr val="accent1">
                     <a:lumMod val="50000"/>
@@ -14533,7 +15076,7 @@
               <a:t>in general</a:t>
             </a:r>
             <a:r>
-              <a:rPr lang="en-US" sz="4800" dirty="0" smtClean="0">
+              <a:rPr lang="en-US" sz="5400" dirty="0" smtClean="0">
                 <a:latin typeface="Comic Sans MS" pitchFamily="66" charset="0"/>
               </a:rPr>
               <a:t> are no better than truth tables. </a:t>
@@ -14542,13 +15085,13 @@
           <a:p>
             <a:pPr algn="l"/>
             <a:r>
-              <a:rPr lang="en-US" sz="4800" dirty="0" smtClean="0">
+              <a:rPr lang="en-US" sz="5400" dirty="0" smtClean="0">
                 <a:latin typeface="Comic Sans MS" pitchFamily="66" charset="0"/>
               </a:rPr>
               <a:t>No </a:t>
             </a:r>
             <a:r>
-              <a:rPr lang="en-US" sz="4800" dirty="0" smtClean="0">
+              <a:rPr lang="en-US" sz="5400" dirty="0" smtClean="0">
                 <a:solidFill>
                   <a:schemeClr val="accent1">
                     <a:lumMod val="50000"/>
@@ -14559,7 +15102,7 @@
               <a:t>efficient method</a:t>
             </a:r>
             <a:r>
-              <a:rPr lang="en-US" sz="4800" dirty="0" smtClean="0">
+              <a:rPr lang="en-US" sz="5400" dirty="0" smtClean="0">
                 <a:latin typeface="Comic Sans MS" pitchFamily="66" charset="0"/>
               </a:rPr>
               <a:t> for</a:t>
@@ -14568,13 +15111,13 @@
           <a:p>
             <a:pPr algn="l"/>
             <a:r>
-              <a:rPr lang="en-US" sz="4800" dirty="0" smtClean="0">
+              <a:rPr lang="en-US" sz="5400" dirty="0" smtClean="0">
                 <a:latin typeface="Comic Sans MS" pitchFamily="66" charset="0"/>
               </a:rPr>
               <a:t>verifying </a:t>
             </a:r>
             <a:r>
-              <a:rPr lang="en-US" sz="4800" dirty="0" smtClean="0">
+              <a:rPr lang="en-US" sz="5400" dirty="0" smtClean="0">
                 <a:solidFill>
                   <a:srgbClr val="BB0FAB"/>
                 </a:solidFill>
@@ -14583,12 +15126,12 @@
               <a:t>validity</a:t>
             </a:r>
             <a:r>
-              <a:rPr lang="en-US" sz="4800" dirty="0" smtClean="0">
+              <a:rPr lang="en-US" sz="5400" dirty="0" smtClean="0">
                 <a:latin typeface="Comic Sans MS" pitchFamily="66" charset="0"/>
               </a:rPr>
               <a:t> is known.</a:t>
             </a:r>
-            <a:endParaRPr lang="en-US" sz="4800" dirty="0">
+            <a:endParaRPr lang="en-US" sz="5400" dirty="0">
               <a:latin typeface="Comic Sans MS" pitchFamily="66" charset="0"/>
             </a:endParaRPr>
           </a:p>
@@ -14621,7 +15164,7 @@
             <a:fld id="{3251DA95-B240-47FE-901D-B78FC8E8E532}" type="slidenum">
               <a:rPr lang="en-US" smtClean="0"/>
               <a:pPr/>
-              <a:t>32</a:t>
+              <a:t>33</a:t>
             </a:fld>
             <a:endParaRPr lang="en-US" dirty="0"/>
           </a:p>
@@ -14638,7 +15181,7 @@
     <a:masterClrMapping/>
   </p:clrMapOvr>
   <p:transition xmlns:p14="http://schemas.microsoft.com/office/powerpoint/2010/main" spd="slow" advClick="0">
-    <p:fade/>
+    <p:fade thruBlk="1"/>
   </p:transition>
   <p:timing>
     <p:tnLst>
@@ -14946,28 +15489,16 @@
               <a:rPr lang="en-US" sz="5400" dirty="0" smtClean="0">
                 <a:latin typeface="Comic Sans MS" pitchFamily="66" charset="0"/>
               </a:rPr>
-              <a:t>A </a:t>
-            </a:r>
+              <a:t>A system for proving</a:t>
+            </a:r>
+          </a:p>
+          <a:p>
+            <a:pPr algn="l"/>
             <a:r>
               <a:rPr lang="en-US" sz="5400" dirty="0" smtClean="0">
                 <a:latin typeface="Comic Sans MS" pitchFamily="66" charset="0"/>
               </a:rPr>
-              <a:t>system for proving</a:t>
-            </a:r>
-          </a:p>
-          <a:p>
-            <a:pPr algn="l"/>
-            <a:r>
-              <a:rPr lang="en-US" sz="5400" dirty="0" smtClean="0">
-                <a:latin typeface="Comic Sans MS" pitchFamily="66" charset="0"/>
-              </a:rPr>
-              <a:t>formulas </a:t>
-            </a:r>
-            <a:r>
-              <a:rPr lang="en-US" sz="5400" dirty="0" smtClean="0">
-                <a:latin typeface="Comic Sans MS" pitchFamily="66" charset="0"/>
-              </a:rPr>
-              <a:t>is </a:t>
+              <a:t>formulas is </a:t>
             </a:r>
             <a:r>
               <a:rPr lang="en-US" sz="5400" dirty="0" smtClean="0">
@@ -15008,7 +15539,7 @@
 </file>
 
 <file path=ppt/slides/slide5.xml><?xml version="1.0" encoding="utf-8"?>
-<p:sld xmlns:a="http://schemas.openxmlformats.org/drawingml/2006/main" xmlns:r="http://schemas.openxmlformats.org/officeDocument/2006/relationships" xmlns:p="http://schemas.openxmlformats.org/presentationml/2006/main" show="0">
+<p:sld xmlns:a="http://schemas.openxmlformats.org/drawingml/2006/main" xmlns:r="http://schemas.openxmlformats.org/officeDocument/2006/relationships" xmlns:p="http://schemas.openxmlformats.org/presentationml/2006/main">
   <p:cSld>
     <p:spTree>
       <p:nvGrpSpPr>
@@ -15120,28 +15651,16 @@
               <a:rPr lang="en-US" sz="5400" dirty="0" smtClean="0">
                 <a:latin typeface="Comic Sans MS" pitchFamily="66" charset="0"/>
               </a:rPr>
-              <a:t>A </a:t>
-            </a:r>
+              <a:t>A system for proving</a:t>
+            </a:r>
+          </a:p>
+          <a:p>
+            <a:pPr algn="l"/>
             <a:r>
               <a:rPr lang="en-US" sz="5400" dirty="0" smtClean="0">
                 <a:latin typeface="Comic Sans MS" pitchFamily="66" charset="0"/>
               </a:rPr>
-              <a:t>system for proving</a:t>
-            </a:r>
-          </a:p>
-          <a:p>
-            <a:pPr algn="l"/>
-            <a:r>
-              <a:rPr lang="en-US" sz="5400" dirty="0" smtClean="0">
-                <a:latin typeface="Comic Sans MS" pitchFamily="66" charset="0"/>
-              </a:rPr>
-              <a:t>formulas </a:t>
-            </a:r>
-            <a:r>
-              <a:rPr lang="en-US" sz="5400" dirty="0" smtClean="0">
-                <a:latin typeface="Comic Sans MS" pitchFamily="66" charset="0"/>
-              </a:rPr>
-              <a:t>is </a:t>
+              <a:t>formulas is </a:t>
             </a:r>
             <a:r>
               <a:rPr lang="en-US" sz="5400" dirty="0" smtClean="0">
@@ -15204,13 +15723,13 @@
   <p:clrMapOvr>
     <a:masterClrMapping/>
   </p:clrMapOvr>
-  <mc:AlternateContent xmlns:mc="http://schemas.openxmlformats.org/markup-compatibility/2006">
-    <mc:Choice xmlns:p14="http://schemas.microsoft.com/office/powerpoint/2010/main" Requires="p14">
+  <mc:AlternateContent xmlns:mc="http://schemas.openxmlformats.org/markup-compatibility/2006" xmlns:p14="http://schemas.microsoft.com/office/powerpoint/2010/main">
+    <mc:Choice Requires="p14">
       <p:transition p14:dur="400" advClick="0">
         <p:fade/>
       </p:transition>
     </mc:Choice>
-    <mc:Fallback>
+    <mc:Fallback xmlns="">
       <p:transition xmlns:p14="http://schemas.microsoft.com/office/powerpoint/2010/main" advClick="0">
         <p:fade/>
       </p:transition>
@@ -15535,7 +16054,7 @@
           <a:graphicData uri="http://schemas.openxmlformats.org/presentationml/2006/ole">
             <mc:AlternateContent xmlns:mc="http://schemas.openxmlformats.org/markup-compatibility/2006">
               <mc:Choice xmlns:v="urn:schemas-microsoft-com:vml" Requires="v">
-                <p:oleObj spid="_x0000_s1182" name="Equation" r:id="rId3" imgW="762000" imgH="457200" progId="Equation.DSMT4">
+                <p:oleObj spid="_x0000_s1189" name="Equation" r:id="rId3" imgW="762000" imgH="457200" progId="Equation.DSMT4">
                   <p:embed/>
                 </p:oleObj>
               </mc:Choice>
@@ -15666,7 +16185,7 @@
           <a:graphicData uri="http://schemas.openxmlformats.org/presentationml/2006/ole">
             <mc:AlternateContent xmlns:mc="http://schemas.openxmlformats.org/markup-compatibility/2006">
               <mc:Choice xmlns:v="urn:schemas-microsoft-com:vml" Requires="v">
-                <p:oleObj spid="_x0000_s1183" name="Equation" r:id="rId5" imgW="1181100" imgH="495300" progId="Equation.DSMT4">
+                <p:oleObj spid="_x0000_s1190" name="Equation" r:id="rId5" imgW="1181100" imgH="495300" progId="Equation.DSMT4">
                   <p:embed/>
                 </p:oleObj>
               </mc:Choice>
@@ -15723,7 +16242,7 @@
           <a:graphicData uri="http://schemas.openxmlformats.org/presentationml/2006/ole">
             <mc:AlternateContent xmlns:mc="http://schemas.openxmlformats.org/markup-compatibility/2006">
               <mc:Choice xmlns:v="urn:schemas-microsoft-com:vml" Requires="v">
-                <p:oleObj spid="_x0000_s1184" name="Equation" r:id="rId7" imgW="444500" imgH="431800" progId="Equation.DSMT4">
+                <p:oleObj spid="_x0000_s1191" name="Equation" r:id="rId7" imgW="444500" imgH="431800" progId="Equation.DSMT4">
                   <p:embed/>
                 </p:oleObj>
               </mc:Choice>
@@ -16516,13 +17035,13 @@
   <p:clrMapOvr>
     <a:masterClrMapping/>
   </p:clrMapOvr>
-  <mc:AlternateContent xmlns:mc="http://schemas.openxmlformats.org/markup-compatibility/2006">
-    <mc:Choice xmlns:p14="http://schemas.microsoft.com/office/powerpoint/2010/main" Requires="p14">
+  <mc:AlternateContent xmlns:mc="http://schemas.openxmlformats.org/markup-compatibility/2006" xmlns:p14="http://schemas.microsoft.com/office/powerpoint/2010/main">
+    <mc:Choice Requires="p14">
       <p:transition spd="med" p14:dur="700" advClick="0">
         <p:fade/>
       </p:transition>
     </mc:Choice>
-    <mc:Fallback>
+    <mc:Fallback xmlns="">
       <p:transition xmlns:p14="http://schemas.microsoft.com/office/powerpoint/2010/main" spd="med" advClick="0">
         <p:fade/>
       </p:transition>

</xml_diff>